<commit_message>
Aggiunto un file excell dove segnare i tempi e gli errori
NOTA: Va integrato con quelli già fatti
</commit_message>
<xml_diff>
--- a/Conoscenze preliminari.pptx
+++ b/Conoscenze preliminari.pptx
@@ -530,7 +530,7 @@
           <a:p>
             <a:fld id="{9AB3A824-1A51-4B26-AD58-A6D8E14F6C04}" type="datetimeFigureOut">
               <a:rPr lang="en-US" smtClean="0"/>
-              <a:t>10/10/2019</a:t>
+              <a:t>10/11/19</a:t>
             </a:fld>
             <a:endParaRPr lang="en-US" dirty="0"/>
           </a:p>
@@ -714,7 +714,7 @@
           <a:p>
             <a:fld id="{1E170309-EE11-1646-B1FB-8A746C5AB87C}" type="datetimeFigureOut">
               <a:rPr lang="it-IT" smtClean="0"/>
-              <a:t>10/10/2019</a:t>
+              <a:t>11/10/19</a:t>
             </a:fld>
             <a:endParaRPr lang="it-IT"/>
           </a:p>
@@ -894,7 +894,7 @@
           <a:p>
             <a:fld id="{1E170309-EE11-1646-B1FB-8A746C5AB87C}" type="datetimeFigureOut">
               <a:rPr lang="it-IT" smtClean="0"/>
-              <a:t>10/10/2019</a:t>
+              <a:t>11/10/19</a:t>
             </a:fld>
             <a:endParaRPr lang="it-IT"/>
           </a:p>
@@ -1064,7 +1064,7 @@
           <a:p>
             <a:fld id="{1E170309-EE11-1646-B1FB-8A746C5AB87C}" type="datetimeFigureOut">
               <a:rPr lang="it-IT" smtClean="0"/>
-              <a:t>10/10/2019</a:t>
+              <a:t>11/10/19</a:t>
             </a:fld>
             <a:endParaRPr lang="it-IT"/>
           </a:p>
@@ -1377,7 +1377,7 @@
           <a:p>
             <a:fld id="{1E170309-EE11-1646-B1FB-8A746C5AB87C}" type="datetimeFigureOut">
               <a:rPr lang="it-IT" smtClean="0"/>
-              <a:t>10/10/2019</a:t>
+              <a:t>11/10/19</a:t>
             </a:fld>
             <a:endParaRPr lang="it-IT"/>
           </a:p>
@@ -1763,7 +1763,7 @@
           <a:p>
             <a:fld id="{1E170309-EE11-1646-B1FB-8A746C5AB87C}" type="datetimeFigureOut">
               <a:rPr lang="it-IT" smtClean="0"/>
-              <a:t>10/10/2019</a:t>
+              <a:t>11/10/19</a:t>
             </a:fld>
             <a:endParaRPr lang="it-IT"/>
           </a:p>
@@ -2197,7 +2197,7 @@
           <a:p>
             <a:fld id="{1E170309-EE11-1646-B1FB-8A746C5AB87C}" type="datetimeFigureOut">
               <a:rPr lang="it-IT" smtClean="0"/>
-              <a:t>10/10/2019</a:t>
+              <a:t>11/10/19</a:t>
             </a:fld>
             <a:endParaRPr lang="it-IT"/>
           </a:p>
@@ -2315,7 +2315,7 @@
           <a:p>
             <a:fld id="{1E170309-EE11-1646-B1FB-8A746C5AB87C}" type="datetimeFigureOut">
               <a:rPr lang="it-IT" smtClean="0"/>
-              <a:t>10/10/2019</a:t>
+              <a:t>11/10/19</a:t>
             </a:fld>
             <a:endParaRPr lang="it-IT"/>
           </a:p>
@@ -2410,7 +2410,7 @@
           <a:p>
             <a:fld id="{1E170309-EE11-1646-B1FB-8A746C5AB87C}" type="datetimeFigureOut">
               <a:rPr lang="it-IT" smtClean="0"/>
-              <a:t>10/10/2019</a:t>
+              <a:t>11/10/19</a:t>
             </a:fld>
             <a:endParaRPr lang="it-IT"/>
           </a:p>
@@ -2760,7 +2760,7 @@
           <a:p>
             <a:fld id="{1E170309-EE11-1646-B1FB-8A746C5AB87C}" type="datetimeFigureOut">
               <a:rPr lang="it-IT" smtClean="0"/>
-              <a:t>10/10/2019</a:t>
+              <a:t>11/10/19</a:t>
             </a:fld>
             <a:endParaRPr lang="it-IT"/>
           </a:p>
@@ -3185,7 +3185,7 @@
           <a:p>
             <a:fld id="{1E170309-EE11-1646-B1FB-8A746C5AB87C}" type="datetimeFigureOut">
               <a:rPr lang="it-IT" smtClean="0"/>
-              <a:t>10/10/2019</a:t>
+              <a:t>11/10/19</a:t>
             </a:fld>
             <a:endParaRPr lang="it-IT"/>
           </a:p>
@@ -3466,7 +3466,7 @@
           <a:p>
             <a:fld id="{1E170309-EE11-1646-B1FB-8A746C5AB87C}" type="datetimeFigureOut">
               <a:rPr lang="it-IT" smtClean="0"/>
-              <a:t>10/10/2019</a:t>
+              <a:t>11/10/19</a:t>
             </a:fld>
             <a:endParaRPr lang="it-IT"/>
           </a:p>
@@ -7702,12 +7702,10 @@
           </a:bodyPr>
           <a:lstStyle/>
           <a:p>
-            <a:pPr indent="-182880">
+            <a:pPr>
               <a:lnSpc>
                 <a:spcPct val="90000"/>
               </a:lnSpc>
-              <a:buFont typeface="Wingdings" pitchFamily="2" charset="2"/>
-              <a:buChar char="§"/>
             </a:pPr>
             <a:r>
               <a:rPr lang="en-US" sz="1800" dirty="0" err="1">
@@ -10412,12 +10410,10 @@
           </a:bodyPr>
           <a:lstStyle/>
           <a:p>
-            <a:pPr indent="-182880">
+            <a:pPr>
               <a:lnSpc>
                 <a:spcPct val="90000"/>
               </a:lnSpc>
-              <a:buFont typeface="Wingdings" pitchFamily="2" charset="2"/>
-              <a:buChar char="§"/>
             </a:pPr>
             <a:r>
               <a:rPr lang="en-US" sz="1800" dirty="0">
@@ -10428,7 +10424,7 @@
               <a:t>Le </a:t>
             </a:r>
             <a:r>
-              <a:rPr lang="en-US" sz="1800">
+              <a:rPr lang="en-US" sz="1800" dirty="0" err="1">
                 <a:solidFill>
                   <a:schemeClr val="tx1"/>
                 </a:solidFill>
@@ -12362,12 +12358,10 @@
           </a:bodyPr>
           <a:lstStyle/>
           <a:p>
-            <a:pPr indent="-182880">
+            <a:pPr>
               <a:lnSpc>
                 <a:spcPct val="90000"/>
               </a:lnSpc>
-              <a:buFont typeface="Wingdings" pitchFamily="2" charset="2"/>
-              <a:buChar char="§"/>
             </a:pPr>
             <a:r>
               <a:rPr lang="en-US" sz="1800" dirty="0">
@@ -13296,20 +13290,250 @@
           </a:bodyPr>
           <a:lstStyle/>
           <a:p>
-            <a:pPr indent="-182880">
+            <a:pPr>
               <a:lnSpc>
                 <a:spcPct val="90000"/>
               </a:lnSpc>
-              <a:buFont typeface="Wingdings" pitchFamily="2" charset="2"/>
-              <a:buChar char="§"/>
             </a:pPr>
             <a:r>
-              <a:rPr lang="en-US" sz="1800">
+              <a:rPr lang="en-US" sz="1800" dirty="0" err="1">
                 <a:solidFill>
                   <a:schemeClr val="tx1"/>
                 </a:solidFill>
               </a:rPr>
-              <a:t>È un raggruppamento di attributi, appartenenti alla stessa entità o relazione, che presentano affinità nel loro significato o uso.</a:t>
+              <a:t>È</a:t>
+            </a:r>
+            <a:r>
+              <a:rPr lang="en-US" sz="1800" dirty="0">
+                <a:solidFill>
+                  <a:schemeClr val="tx1"/>
+                </a:solidFill>
+              </a:rPr>
+              <a:t> un </a:t>
+            </a:r>
+            <a:r>
+              <a:rPr lang="en-US" sz="1800" dirty="0" err="1">
+                <a:solidFill>
+                  <a:schemeClr val="tx1"/>
+                </a:solidFill>
+              </a:rPr>
+              <a:t>raggruppamento</a:t>
+            </a:r>
+            <a:r>
+              <a:rPr lang="en-US" sz="1800" dirty="0">
+                <a:solidFill>
+                  <a:schemeClr val="tx1"/>
+                </a:solidFill>
+              </a:rPr>
+              <a:t> di </a:t>
+            </a:r>
+            <a:r>
+              <a:rPr lang="en-US" sz="1800" dirty="0" err="1">
+                <a:solidFill>
+                  <a:schemeClr val="tx1"/>
+                </a:solidFill>
+              </a:rPr>
+              <a:t>attributi</a:t>
+            </a:r>
+            <a:r>
+              <a:rPr lang="en-US" sz="1800" dirty="0">
+                <a:solidFill>
+                  <a:schemeClr val="tx1"/>
+                </a:solidFill>
+              </a:rPr>
+              <a:t>, </a:t>
+            </a:r>
+            <a:r>
+              <a:rPr lang="en-US" sz="1800" dirty="0" err="1">
+                <a:solidFill>
+                  <a:schemeClr val="tx1"/>
+                </a:solidFill>
+              </a:rPr>
+              <a:t>appartenenti</a:t>
+            </a:r>
+            <a:r>
+              <a:rPr lang="en-US" sz="1800" dirty="0">
+                <a:solidFill>
+                  <a:schemeClr val="tx1"/>
+                </a:solidFill>
+              </a:rPr>
+              <a:t> </a:t>
+            </a:r>
+            <a:r>
+              <a:rPr lang="en-US" sz="1800" dirty="0" err="1">
+                <a:solidFill>
+                  <a:schemeClr val="tx1"/>
+                </a:solidFill>
+              </a:rPr>
+              <a:t>alla</a:t>
+            </a:r>
+            <a:r>
+              <a:rPr lang="en-US" sz="1800" dirty="0">
+                <a:solidFill>
+                  <a:schemeClr val="tx1"/>
+                </a:solidFill>
+              </a:rPr>
+              <a:t> </a:t>
+            </a:r>
+            <a:r>
+              <a:rPr lang="en-US" sz="1800" dirty="0" err="1">
+                <a:solidFill>
+                  <a:schemeClr val="tx1"/>
+                </a:solidFill>
+              </a:rPr>
+              <a:t>stessa</a:t>
+            </a:r>
+            <a:r>
+              <a:rPr lang="en-US" sz="1800" dirty="0">
+                <a:solidFill>
+                  <a:schemeClr val="tx1"/>
+                </a:solidFill>
+              </a:rPr>
+              <a:t> </a:t>
+            </a:r>
+            <a:r>
+              <a:rPr lang="en-US" sz="1800" dirty="0" err="1">
+                <a:solidFill>
+                  <a:schemeClr val="tx1"/>
+                </a:solidFill>
+              </a:rPr>
+              <a:t>entità</a:t>
+            </a:r>
+            <a:r>
+              <a:rPr lang="en-US" sz="1800" dirty="0">
+                <a:solidFill>
+                  <a:schemeClr val="tx1"/>
+                </a:solidFill>
+              </a:rPr>
+              <a:t> o </a:t>
+            </a:r>
+            <a:r>
+              <a:rPr lang="en-US" sz="1800" dirty="0" err="1">
+                <a:solidFill>
+                  <a:schemeClr val="tx1"/>
+                </a:solidFill>
+              </a:rPr>
+              <a:t>relazione</a:t>
+            </a:r>
+            <a:r>
+              <a:rPr lang="en-US" sz="1800" dirty="0">
+                <a:solidFill>
+                  <a:schemeClr val="tx1"/>
+                </a:solidFill>
+              </a:rPr>
+              <a:t>, </a:t>
+            </a:r>
+            <a:r>
+              <a:rPr lang="en-US" sz="1800" dirty="0" err="1">
+                <a:solidFill>
+                  <a:schemeClr val="tx1"/>
+                </a:solidFill>
+              </a:rPr>
+              <a:t>che</a:t>
+            </a:r>
+            <a:r>
+              <a:rPr lang="en-US" sz="1800" dirty="0">
+                <a:solidFill>
+                  <a:schemeClr val="tx1"/>
+                </a:solidFill>
+              </a:rPr>
+              <a:t> </a:t>
+            </a:r>
+            <a:r>
+              <a:rPr lang="en-US" sz="1800" dirty="0" err="1">
+                <a:solidFill>
+                  <a:schemeClr val="tx1"/>
+                </a:solidFill>
+              </a:rPr>
+              <a:t>presentano</a:t>
+            </a:r>
+            <a:r>
+              <a:rPr lang="en-US" sz="1800" dirty="0">
+                <a:solidFill>
+                  <a:schemeClr val="tx1"/>
+                </a:solidFill>
+              </a:rPr>
+              <a:t> </a:t>
+            </a:r>
+            <a:r>
+              <a:rPr lang="en-US" sz="1800" dirty="0" err="1">
+                <a:solidFill>
+                  <a:schemeClr val="tx1"/>
+                </a:solidFill>
+              </a:rPr>
+              <a:t>affinità</a:t>
+            </a:r>
+            <a:r>
+              <a:rPr lang="en-US" sz="1800" dirty="0">
+                <a:solidFill>
+                  <a:schemeClr val="tx1"/>
+                </a:solidFill>
+              </a:rPr>
+              <a:t> </a:t>
+            </a:r>
+            <a:r>
+              <a:rPr lang="en-US" sz="1800" dirty="0" err="1">
+                <a:solidFill>
+                  <a:schemeClr val="tx1"/>
+                </a:solidFill>
+              </a:rPr>
+              <a:t>nel</a:t>
+            </a:r>
+            <a:r>
+              <a:rPr lang="en-US" sz="1800" dirty="0">
+                <a:solidFill>
+                  <a:schemeClr val="tx1"/>
+                </a:solidFill>
+              </a:rPr>
+              <a:t> </a:t>
+            </a:r>
+            <a:r>
+              <a:rPr lang="en-US" sz="1800" dirty="0" err="1">
+                <a:solidFill>
+                  <a:schemeClr val="tx1"/>
+                </a:solidFill>
+              </a:rPr>
+              <a:t>loro</a:t>
+            </a:r>
+            <a:r>
+              <a:rPr lang="en-US" sz="1800" dirty="0">
+                <a:solidFill>
+                  <a:schemeClr val="tx1"/>
+                </a:solidFill>
+              </a:rPr>
+              <a:t> </a:t>
+            </a:r>
+            <a:r>
+              <a:rPr lang="en-US" sz="1800" dirty="0" err="1">
+                <a:solidFill>
+                  <a:schemeClr val="tx1"/>
+                </a:solidFill>
+              </a:rPr>
+              <a:t>significato</a:t>
+            </a:r>
+            <a:r>
+              <a:rPr lang="en-US" sz="1800" dirty="0">
+                <a:solidFill>
+                  <a:schemeClr val="tx1"/>
+                </a:solidFill>
+              </a:rPr>
+              <a:t> o </a:t>
+            </a:r>
+            <a:r>
+              <a:rPr lang="en-US" sz="1800" dirty="0" err="1">
+                <a:solidFill>
+                  <a:schemeClr val="tx1"/>
+                </a:solidFill>
+              </a:rPr>
+              <a:t>uso</a:t>
+            </a:r>
+            <a:r>
+              <a:rPr lang="en-US" sz="1800" dirty="0">
+                <a:solidFill>
+                  <a:schemeClr val="tx1"/>
+                </a:solidFill>
+              </a:rPr>
+              <a:t>.</a:t>
             </a:r>
           </a:p>
         </p:txBody>
@@ -14055,8 +14279,8 @@
         </p:nvSpPr>
         <p:spPr>
           <a:xfrm>
-            <a:off x="1285456" y="4162031"/>
-            <a:ext cx="9313271" cy="1767141"/>
+            <a:off x="984504" y="3981573"/>
+            <a:ext cx="10222992" cy="2595497"/>
           </a:xfrm>
         </p:spPr>
         <p:txBody>
@@ -14065,7 +14289,7 @@
           </a:bodyPr>
           <a:lstStyle/>
           <a:p>
-            <a:pPr algn="r"/>
+            <a:pPr algn="ctr"/>
             <a:r>
               <a:rPr lang="en-US" sz="3000" dirty="0" err="1"/>
               <a:t>trasformazione</a:t>
@@ -16515,6 +16739,9 @@
             </a:lvl9pPr>
           </a:lstStyle>
           <a:p>
+            <a:pPr marL="0" indent="0">
+              <a:buNone/>
+            </a:pPr>
             <a:r>
               <a:rPr lang="en-US" sz="1800" dirty="0" err="1"/>
               <a:t>Relazione</a:t>

</xml_diff>